<commit_message>
Updated testing presentation powerpoint slides
</commit_message>
<xml_diff>
--- a/Design Documents/_OldStuff/Testing Presentation/PresentationSoftEng.pptx
+++ b/Design Documents/_OldStuff/Testing Presentation/PresentationSoftEng.pptx
@@ -193,7 +193,7 @@
           <a:lstStyle/>
           <a:p>
             <a:pPr algn="ctr"/>
-            <a:endParaRPr lang="en-US"/>
+            <a:endParaRPr lang="en-US" dirty="0"/>
           </a:p>
         </p:txBody>
       </p:sp>
@@ -402,7 +402,7 @@
           <a:lstStyle/>
           <a:p>
             <a:pPr algn="ctr"/>
-            <a:endParaRPr lang="en-US"/>
+            <a:endParaRPr lang="en-US" dirty="0"/>
           </a:p>
         </p:txBody>
       </p:sp>
@@ -605,7 +605,7 @@
               <a:pPr/>
               <a:t>November 17, 2016</a:t>
             </a:fld>
-            <a:endParaRPr lang="en-US"/>
+            <a:endParaRPr lang="en-US" dirty="0"/>
           </a:p>
         </p:txBody>
       </p:sp>
@@ -624,7 +624,7 @@
           <a:bodyPr/>
           <a:lstStyle/>
           <a:p>
-            <a:endParaRPr lang="en-US"/>
+            <a:endParaRPr lang="en-US" dirty="0"/>
           </a:p>
         </p:txBody>
       </p:sp>
@@ -648,7 +648,7 @@
               <a:pPr/>
               <a:t>‹#›</a:t>
             </a:fld>
-            <a:endParaRPr lang="en-US"/>
+            <a:endParaRPr lang="en-US" dirty="0"/>
           </a:p>
         </p:txBody>
       </p:sp>
@@ -770,7 +770,7 @@
               <a:pPr/>
               <a:t>November 17, 2016</a:t>
             </a:fld>
-            <a:endParaRPr lang="en-US"/>
+            <a:endParaRPr lang="en-US" dirty="0"/>
           </a:p>
         </p:txBody>
       </p:sp>
@@ -789,7 +789,7 @@
           <a:bodyPr/>
           <a:lstStyle/>
           <a:p>
-            <a:endParaRPr lang="en-US"/>
+            <a:endParaRPr lang="en-US" dirty="0"/>
           </a:p>
         </p:txBody>
       </p:sp>
@@ -813,7 +813,7 @@
               <a:pPr/>
               <a:t>‹#›</a:t>
             </a:fld>
-            <a:endParaRPr lang="en-US"/>
+            <a:endParaRPr lang="en-US" dirty="0"/>
           </a:p>
         </p:txBody>
       </p:sp>
@@ -946,7 +946,7 @@
               <a:pPr/>
               <a:t>November 17, 2016</a:t>
             </a:fld>
-            <a:endParaRPr lang="en-US"/>
+            <a:endParaRPr lang="en-US" dirty="0"/>
           </a:p>
         </p:txBody>
       </p:sp>
@@ -965,7 +965,7 @@
           <a:bodyPr/>
           <a:lstStyle/>
           <a:p>
-            <a:endParaRPr lang="en-US"/>
+            <a:endParaRPr lang="en-US" dirty="0"/>
           </a:p>
         </p:txBody>
       </p:sp>
@@ -989,7 +989,7 @@
               <a:pPr/>
               <a:t>‹#›</a:t>
             </a:fld>
-            <a:endParaRPr lang="en-US"/>
+            <a:endParaRPr lang="en-US" dirty="0"/>
           </a:p>
         </p:txBody>
       </p:sp>
@@ -1112,7 +1112,7 @@
               <a:pPr/>
               <a:t>November 17, 2016</a:t>
             </a:fld>
-            <a:endParaRPr lang="en-US"/>
+            <a:endParaRPr lang="en-US" dirty="0"/>
           </a:p>
         </p:txBody>
       </p:sp>
@@ -1131,7 +1131,7 @@
           <a:bodyPr/>
           <a:lstStyle/>
           <a:p>
-            <a:endParaRPr lang="en-US"/>
+            <a:endParaRPr lang="en-US" dirty="0"/>
           </a:p>
         </p:txBody>
       </p:sp>
@@ -1155,7 +1155,7 @@
               <a:pPr/>
               <a:t>‹#›</a:t>
             </a:fld>
-            <a:endParaRPr lang="en-US"/>
+            <a:endParaRPr lang="en-US" dirty="0"/>
           </a:p>
         </p:txBody>
       </p:sp>
@@ -1387,7 +1387,7 @@
           <a:lstStyle/>
           <a:p>
             <a:pPr algn="ctr"/>
-            <a:endParaRPr lang="en-US"/>
+            <a:endParaRPr lang="en-US" dirty="0"/>
           </a:p>
         </p:txBody>
       </p:sp>
@@ -1435,7 +1435,7 @@
           <a:lstStyle/>
           <a:p>
             <a:pPr algn="ctr"/>
-            <a:endParaRPr lang="en-US"/>
+            <a:endParaRPr lang="en-US" dirty="0"/>
           </a:p>
         </p:txBody>
       </p:sp>
@@ -1667,7 +1667,7 @@
               <a:pPr/>
               <a:t>November 17, 2016</a:t>
             </a:fld>
-            <a:endParaRPr lang="en-US"/>
+            <a:endParaRPr lang="en-US" dirty="0"/>
           </a:p>
         </p:txBody>
       </p:sp>
@@ -1686,7 +1686,7 @@
           <a:bodyPr/>
           <a:lstStyle/>
           <a:p>
-            <a:endParaRPr lang="en-US"/>
+            <a:endParaRPr lang="en-US" dirty="0"/>
           </a:p>
         </p:txBody>
       </p:sp>
@@ -1710,7 +1710,7 @@
               <a:pPr/>
               <a:t>‹#›</a:t>
             </a:fld>
-            <a:endParaRPr lang="en-US"/>
+            <a:endParaRPr lang="en-US" dirty="0"/>
           </a:p>
         </p:txBody>
       </p:sp>
@@ -1929,7 +1929,7 @@
               <a:pPr/>
               <a:t>November 17, 2016</a:t>
             </a:fld>
-            <a:endParaRPr lang="en-US"/>
+            <a:endParaRPr lang="en-US" dirty="0"/>
           </a:p>
         </p:txBody>
       </p:sp>
@@ -1948,7 +1948,7 @@
           <a:bodyPr/>
           <a:lstStyle/>
           <a:p>
-            <a:endParaRPr lang="en-US"/>
+            <a:endParaRPr lang="en-US" dirty="0"/>
           </a:p>
         </p:txBody>
       </p:sp>
@@ -1972,7 +1972,7 @@
               <a:pPr/>
               <a:t>‹#›</a:t>
             </a:fld>
-            <a:endParaRPr lang="en-US"/>
+            <a:endParaRPr lang="en-US" dirty="0"/>
           </a:p>
         </p:txBody>
       </p:sp>
@@ -2417,7 +2417,7 @@
               <a:pPr/>
               <a:t>November 17, 2016</a:t>
             </a:fld>
-            <a:endParaRPr lang="en-US"/>
+            <a:endParaRPr lang="en-US" dirty="0"/>
           </a:p>
         </p:txBody>
       </p:sp>
@@ -2436,7 +2436,7 @@
           <a:bodyPr/>
           <a:lstStyle/>
           <a:p>
-            <a:endParaRPr lang="en-US"/>
+            <a:endParaRPr lang="en-US" dirty="0"/>
           </a:p>
         </p:txBody>
       </p:sp>
@@ -2460,7 +2460,7 @@
               <a:pPr/>
               <a:t>‹#›</a:t>
             </a:fld>
-            <a:endParaRPr lang="en-US"/>
+            <a:endParaRPr lang="en-US" dirty="0"/>
           </a:p>
         </p:txBody>
       </p:sp>
@@ -2531,7 +2531,7 @@
               <a:pPr/>
               <a:t>November 17, 2016</a:t>
             </a:fld>
-            <a:endParaRPr lang="en-US"/>
+            <a:endParaRPr lang="en-US" dirty="0"/>
           </a:p>
         </p:txBody>
       </p:sp>
@@ -2550,7 +2550,7 @@
           <a:bodyPr/>
           <a:lstStyle/>
           <a:p>
-            <a:endParaRPr lang="en-US"/>
+            <a:endParaRPr lang="en-US" dirty="0"/>
           </a:p>
         </p:txBody>
       </p:sp>
@@ -2574,7 +2574,7 @@
               <a:pPr/>
               <a:t>‹#›</a:t>
             </a:fld>
-            <a:endParaRPr lang="en-US"/>
+            <a:endParaRPr lang="en-US" dirty="0"/>
           </a:p>
         </p:txBody>
       </p:sp>
@@ -2623,7 +2623,7 @@
               <a:pPr/>
               <a:t>November 17, 2016</a:t>
             </a:fld>
-            <a:endParaRPr lang="en-US"/>
+            <a:endParaRPr lang="en-US" dirty="0"/>
           </a:p>
         </p:txBody>
       </p:sp>
@@ -2642,7 +2642,7 @@
           <a:bodyPr/>
           <a:lstStyle/>
           <a:p>
-            <a:endParaRPr lang="en-US"/>
+            <a:endParaRPr lang="en-US" dirty="0"/>
           </a:p>
         </p:txBody>
       </p:sp>
@@ -2666,7 +2666,7 @@
               <a:pPr/>
               <a:t>‹#›</a:t>
             </a:fld>
-            <a:endParaRPr lang="en-US"/>
+            <a:endParaRPr lang="en-US" dirty="0"/>
           </a:p>
         </p:txBody>
       </p:sp>
@@ -2737,7 +2737,7 @@
           <a:lstStyle/>
           <a:p>
             <a:pPr algn="ctr"/>
-            <a:endParaRPr lang="en-US"/>
+            <a:endParaRPr lang="en-US" dirty="0"/>
           </a:p>
         </p:txBody>
       </p:sp>
@@ -2785,7 +2785,7 @@
           <a:lstStyle/>
           <a:p>
             <a:pPr marL="0" algn="ctr" defTabSz="914400" rtl="0" eaLnBrk="1" latinLnBrk="0" hangingPunct="1"/>
-            <a:endParaRPr lang="en-US" sz="1800" kern="1200">
+            <a:endParaRPr lang="en-US" sz="1800" kern="1200" dirty="0">
               <a:solidFill>
                 <a:schemeClr val="lt1"/>
               </a:solidFill>
@@ -3055,7 +3055,7 @@
               <a:pPr/>
               <a:t>November 17, 2016</a:t>
             </a:fld>
-            <a:endParaRPr lang="en-US"/>
+            <a:endParaRPr lang="en-US" dirty="0"/>
           </a:p>
         </p:txBody>
       </p:sp>
@@ -3352,7 +3352,7 @@
           <a:lstStyle/>
           <a:p>
             <a:pPr algn="ctr"/>
-            <a:endParaRPr lang="en-US"/>
+            <a:endParaRPr lang="en-US" dirty="0"/>
           </a:p>
         </p:txBody>
       </p:sp>
@@ -3459,7 +3459,7 @@
           <a:lstStyle/>
           <a:p>
             <a:pPr algn="ctr"/>
-            <a:endParaRPr lang="en-US"/>
+            <a:endParaRPr lang="en-US" dirty="0"/>
           </a:p>
         </p:txBody>
       </p:sp>
@@ -3585,7 +3585,7 @@
               <a:pPr/>
               <a:t>November 17, 2016</a:t>
             </a:fld>
-            <a:endParaRPr lang="en-US"/>
+            <a:endParaRPr lang="en-US" dirty="0"/>
           </a:p>
         </p:txBody>
       </p:sp>
@@ -3604,7 +3604,7 @@
           <a:bodyPr/>
           <a:lstStyle/>
           <a:p>
-            <a:endParaRPr lang="en-US"/>
+            <a:endParaRPr lang="en-US" dirty="0"/>
           </a:p>
         </p:txBody>
       </p:sp>
@@ -3628,7 +3628,7 @@
               <a:pPr/>
               <a:t>‹#›</a:t>
             </a:fld>
-            <a:endParaRPr lang="en-US"/>
+            <a:endParaRPr lang="en-US" dirty="0"/>
           </a:p>
         </p:txBody>
       </p:sp>
@@ -3973,7 +3973,7 @@
           <a:lstStyle/>
           <a:p>
             <a:pPr algn="ctr"/>
-            <a:endParaRPr lang="en-US"/>
+            <a:endParaRPr lang="en-US" dirty="0"/>
           </a:p>
         </p:txBody>
       </p:sp>
@@ -4292,7 +4292,7 @@
           <a:lstStyle/>
           <a:p>
             <a:pPr algn="ctr"/>
-            <a:endParaRPr lang="en-US"/>
+            <a:endParaRPr lang="en-US" dirty="0"/>
           </a:p>
         </p:txBody>
       </p:sp>
@@ -4932,7 +4932,12 @@
             <p:ph idx="1"/>
           </p:nvPr>
         </p:nvSpPr>
-        <p:spPr/>
+        <p:spPr>
+          <a:xfrm>
+            <a:off x="822960" y="1348959"/>
+            <a:ext cx="5733288" cy="3579849"/>
+          </a:xfrm>
+        </p:spPr>
         <p:txBody>
           <a:bodyPr/>
           <a:lstStyle/>
@@ -4943,7 +4948,11 @@
             </a:pPr>
             <a:r>
               <a:rPr lang="en-US" dirty="0"/>
-              <a:t>Preconditions/Setup: Tester must have placed an order, and be at the order confirmation page.</a:t>
+              <a:t>Preconditions/Setup: </a:t>
+            </a:r>
+            <a:r>
+              <a:rPr lang="en-US" b="0" dirty="0"/>
+              <a:t>Tester must have placed an order, and be at the order confirmation page.</a:t>
             </a:r>
           </a:p>
           <a:p>
@@ -4953,7 +4962,11 @@
             </a:pPr>
             <a:r>
               <a:rPr lang="en-US" dirty="0"/>
-              <a:t>Requirement(s) Tested: Confirm/Cancel Order</a:t>
+              <a:t>Requirement(s) Tested: </a:t>
+            </a:r>
+            <a:r>
+              <a:rPr lang="en-US" b="0" dirty="0"/>
+              <a:t>Confirm/Cancel Order</a:t>
             </a:r>
           </a:p>
           <a:p>
@@ -4963,7 +4976,11 @@
             </a:pPr>
             <a:r>
               <a:rPr lang="en-US" dirty="0"/>
-              <a:t>Action 1: Tester fails to activate the Confirm Order button (either by leaving the confirmation page or losing connection to the server).</a:t>
+              <a:t>Action 1: </a:t>
+            </a:r>
+            <a:r>
+              <a:rPr lang="en-US" b="0" dirty="0"/>
+              <a:t>Tester fails to activate the Confirm Order button (either by leaving the confirmation page or losing connection to the server).</a:t>
             </a:r>
           </a:p>
           <a:p>
@@ -4973,7 +4990,11 @@
             </a:pPr>
             <a:r>
               <a:rPr lang="en-US" dirty="0"/>
-              <a:t>Action 2: Tester activates the Orders navbar link.</a:t>
+              <a:t>Action 2: </a:t>
+            </a:r>
+            <a:r>
+              <a:rPr lang="en-US" b="0" dirty="0"/>
+              <a:t>Tester activates the Orders navbar link.</a:t>
             </a:r>
           </a:p>
           <a:p>
@@ -4983,12 +5004,39 @@
             </a:pPr>
             <a:r>
               <a:rPr lang="en-US" dirty="0"/>
-              <a:t>Verify 1: Tester confirms that nothing was added to the order status page.</a:t>
-            </a:r>
-            <a:endParaRPr lang="en-US" dirty="0"/>
-          </a:p>
-        </p:txBody>
-      </p:sp>
+              <a:t>Verify 1: </a:t>
+            </a:r>
+            <a:r>
+              <a:rPr lang="en-US" b="0" dirty="0"/>
+              <a:t>Tester confirms that nothing was added to the order status page.</a:t>
+            </a:r>
+          </a:p>
+        </p:txBody>
+      </p:sp>
+      <p:pic>
+        <p:nvPicPr>
+          <p:cNvPr id="4" name="Picture 3"/>
+          <p:cNvPicPr>
+            <a:picLocks noChangeAspect="1"/>
+          </p:cNvPicPr>
+          <p:nvPr/>
+        </p:nvPicPr>
+        <p:blipFill>
+          <a:blip r:embed="rId2"/>
+          <a:stretch>
+            <a:fillRect/>
+          </a:stretch>
+        </p:blipFill>
+        <p:spPr>
+          <a:xfrm>
+            <a:off x="7092635" y="484439"/>
+            <a:ext cx="1396105" cy="4444369"/>
+          </a:xfrm>
+          <a:prstGeom prst="rect">
+            <a:avLst/>
+          </a:prstGeom>
+        </p:spPr>
+      </p:pic>
     </p:spTree>
     <p:extLst>
       <p:ext uri="{BB962C8B-B14F-4D97-AF65-F5344CB8AC3E}">
@@ -5051,49 +5099,100 @@
             <p:ph idx="1"/>
           </p:nvPr>
         </p:nvSpPr>
-        <p:spPr/>
+        <p:spPr>
+          <a:xfrm>
+            <a:off x="822960" y="1100628"/>
+            <a:ext cx="5925312" cy="3718260"/>
+          </a:xfrm>
+        </p:spPr>
         <p:txBody>
           <a:bodyPr/>
           <a:lstStyle/>
           <a:p>
             <a:r>
               <a:rPr lang="en-US" dirty="0"/>
-              <a:t>Preconditions/Setup: Tester must be logged in as a Manager.</a:t>
+              <a:t>Preconditions/Setup: </a:t>
+            </a:r>
+            <a:r>
+              <a:rPr lang="en-US" b="0" dirty="0"/>
+              <a:t>Tester must be logged in as a Manager.</a:t>
             </a:r>
           </a:p>
           <a:p>
             <a:r>
               <a:rPr lang="en-US" dirty="0"/>
-              <a:t>Requirement(s) Tested: View Manager Reports</a:t>
+              <a:t>Requirement(s) Tested: </a:t>
+            </a:r>
+            <a:r>
+              <a:rPr lang="en-US" b="0" dirty="0"/>
+              <a:t>View Manager Reports</a:t>
             </a:r>
           </a:p>
           <a:p>
             <a:r>
               <a:rPr lang="en-US" dirty="0"/>
-              <a:t>Action 1: Tester activates the Reports navbar link.</a:t>
+              <a:t>Action 1: </a:t>
+            </a:r>
+            <a:r>
+              <a:rPr lang="en-US" b="0" dirty="0"/>
+              <a:t>Tester activates the Reports navbar link.</a:t>
             </a:r>
           </a:p>
           <a:p>
             <a:r>
               <a:rPr lang="en-US" dirty="0"/>
-              <a:t>Verify 1: Tester confirms that the Reports page is displayed within the content pane.</a:t>
+              <a:t>Verify 1: </a:t>
+            </a:r>
+            <a:r>
+              <a:rPr lang="en-US" b="0" dirty="0"/>
+              <a:t>Tester confirms that the Reports page is displayed within the content pane.</a:t>
             </a:r>
           </a:p>
           <a:p>
             <a:r>
               <a:rPr lang="en-US" dirty="0"/>
-              <a:t>Action 2: Tester selects the desired report.</a:t>
+              <a:t>Action 2: </a:t>
+            </a:r>
+            <a:r>
+              <a:rPr lang="en-US" b="0" dirty="0"/>
+              <a:t>Tester selects the desired report.</a:t>
             </a:r>
           </a:p>
           <a:p>
             <a:r>
               <a:rPr lang="en-US" dirty="0"/>
-              <a:t>Verify 2: Tester confirms that the selected report is displayed on the page.</a:t>
-            </a:r>
-            <a:endParaRPr lang="en-US" dirty="0"/>
-          </a:p>
-        </p:txBody>
-      </p:sp>
+              <a:t>Verify 2: </a:t>
+            </a:r>
+            <a:r>
+              <a:rPr lang="en-US" b="0" dirty="0"/>
+              <a:t>Tester confirms that the selected report is displayed on the page.</a:t>
+            </a:r>
+          </a:p>
+        </p:txBody>
+      </p:sp>
+      <p:pic>
+        <p:nvPicPr>
+          <p:cNvPr id="4" name="Picture 3"/>
+          <p:cNvPicPr>
+            <a:picLocks noChangeAspect="1"/>
+          </p:cNvPicPr>
+          <p:nvPr/>
+        </p:nvPicPr>
+        <p:blipFill rotWithShape="1">
+          <a:blip r:embed="rId2"/>
+          <a:srcRect l="-123" t="7884" r="81576" b="43247"/>
+          <a:stretch/>
+        </p:blipFill>
+        <p:spPr>
+          <a:xfrm>
+            <a:off x="6748272" y="826308"/>
+            <a:ext cx="1749873" cy="2862759"/>
+          </a:xfrm>
+          <a:prstGeom prst="rect">
+            <a:avLst/>
+          </a:prstGeom>
+        </p:spPr>
+      </p:pic>
     </p:spTree>
     <p:extLst>
       <p:ext uri="{BB962C8B-B14F-4D97-AF65-F5344CB8AC3E}">
@@ -5313,6 +5412,13 @@
   <p:clrMapOvr>
     <a:masterClrMapping/>
   </p:clrMapOvr>
+  <p:timing>
+    <p:tnLst>
+      <p:par>
+        <p:cTn id="1" dur="indefinite" restart="never" nodeType="tmRoot"/>
+      </p:par>
+    </p:tnLst>
+  </p:timing>
 </p:sld>
 </file>
 
@@ -5504,6 +5610,13 @@
   <p:clrMapOvr>
     <a:masterClrMapping/>
   </p:clrMapOvr>
+  <p:timing>
+    <p:tnLst>
+      <p:par>
+        <p:cTn id="1" dur="indefinite" restart="never" nodeType="tmRoot"/>
+      </p:par>
+    </p:tnLst>
+  </p:timing>
 </p:sld>
 </file>
 
@@ -5650,6 +5763,13 @@
   <p:clrMapOvr>
     <a:masterClrMapping/>
   </p:clrMapOvr>
+  <p:timing>
+    <p:tnLst>
+      <p:par>
+        <p:cTn id="1" dur="indefinite" restart="never" nodeType="tmRoot"/>
+      </p:par>
+    </p:tnLst>
+  </p:timing>
 </p:sld>
 </file>
 
@@ -5788,6 +5908,13 @@
   <p:clrMapOvr>
     <a:masterClrMapping/>
   </p:clrMapOvr>
+  <p:timing>
+    <p:tnLst>
+      <p:par>
+        <p:cTn id="1" dur="indefinite" restart="never" nodeType="tmRoot"/>
+      </p:par>
+    </p:tnLst>
+  </p:timing>
 </p:sld>
 </file>
 
@@ -5946,6 +6073,13 @@
   <p:clrMapOvr>
     <a:masterClrMapping/>
   </p:clrMapOvr>
+  <p:timing>
+    <p:tnLst>
+      <p:par>
+        <p:cTn id="1" dur="indefinite" restart="never" nodeType="tmRoot"/>
+      </p:par>
+    </p:tnLst>
+  </p:timing>
 </p:sld>
 </file>
 
@@ -5981,6 +6115,7 @@
           <a:bodyPr/>
           <a:lstStyle/>
           <a:p>
+            <a:pPr algn="ctr"/>
             <a:r>
               <a:rPr lang="en-US" dirty="0"/>
               <a:t>Functional Decomposition Diagram</a:t>
@@ -6012,8 +6147,8 @@
         </p:blipFill>
         <p:spPr>
           <a:xfrm>
-            <a:off x="1699993" y="1100138"/>
-            <a:ext cx="5766239" cy="3579812"/>
+            <a:off x="1133065" y="914400"/>
+            <a:ext cx="6483887" cy="4025344"/>
           </a:xfrm>
         </p:spPr>
       </p:pic>
@@ -6027,6 +6162,13 @@
   <p:clrMapOvr>
     <a:masterClrMapping/>
   </p:clrMapOvr>
+  <p:timing>
+    <p:tnLst>
+      <p:par>
+        <p:cTn id="1" dur="indefinite" restart="never" nodeType="tmRoot"/>
+      </p:par>
+    </p:tnLst>
+  </p:timing>
 </p:sld>
 </file>
 
@@ -6090,7 +6232,11 @@
             </a:pPr>
             <a:r>
               <a:rPr lang="en-US" dirty="0"/>
-              <a:t>Preconditions/Setup: Tester must be at the home page.</a:t>
+              <a:t>Preconditions/Setup: </a:t>
+            </a:r>
+            <a:r>
+              <a:rPr lang="en-US" b="0" dirty="0"/>
+              <a:t>Tester must be at the home page.</a:t>
             </a:r>
           </a:p>
           <a:p>
@@ -6100,7 +6246,11 @@
             </a:pPr>
             <a:r>
               <a:rPr lang="en-US" dirty="0"/>
-              <a:t>Requirement(s) Tested: View Menu</a:t>
+              <a:t>Requirement(s) Tested: </a:t>
+            </a:r>
+            <a:r>
+              <a:rPr lang="en-US" b="0" dirty="0"/>
+              <a:t>View Menu</a:t>
             </a:r>
           </a:p>
           <a:p>
@@ -6110,7 +6260,11 @@
             </a:pPr>
             <a:r>
               <a:rPr lang="en-US" dirty="0"/>
-              <a:t>Action 1: Tester activates View Menu link.</a:t>
+              <a:t>Action 1: </a:t>
+            </a:r>
+            <a:r>
+              <a:rPr lang="en-US" b="0" dirty="0"/>
+              <a:t>Tester activates View Menu link.</a:t>
             </a:r>
           </a:p>
           <a:p>
@@ -6120,12 +6274,44 @@
             </a:pPr>
             <a:r>
               <a:rPr lang="en-US" dirty="0"/>
-              <a:t>Verify 1: Tester confirms that the menu page is displayed within the content pane.</a:t>
-            </a:r>
-            <a:endParaRPr lang="en-US" dirty="0"/>
-          </a:p>
-        </p:txBody>
-      </p:sp>
+              <a:t>Verify 1: </a:t>
+            </a:r>
+            <a:r>
+              <a:rPr lang="en-US" b="0" dirty="0"/>
+              <a:t>Tester confirms that the menu page is displayed within the content pane.</a:t>
+            </a:r>
+          </a:p>
+        </p:txBody>
+      </p:sp>
+      <p:pic>
+        <p:nvPicPr>
+          <p:cNvPr id="5" name="Picture 4"/>
+          <p:cNvPicPr>
+            <a:picLocks noChangeAspect="1"/>
+          </p:cNvPicPr>
+          <p:nvPr/>
+        </p:nvPicPr>
+        <p:blipFill rotWithShape="1">
+          <a:blip r:embed="rId2">
+            <a:extLst>
+              <a:ext uri="{28A0092B-C50C-407E-A947-70E740481C1C}">
+                <a14:useLocalDpi xmlns:a14="http://schemas.microsoft.com/office/drawing/2010/main" val="0"/>
+              </a:ext>
+            </a:extLst>
+          </a:blip>
+          <a:srcRect l="62560" t="2298" r="21399" b="54571"/>
+          <a:stretch/>
+        </p:blipFill>
+        <p:spPr>
+          <a:xfrm>
+            <a:off x="3867912" y="2632220"/>
+            <a:ext cx="1435608" cy="2396362"/>
+          </a:xfrm>
+          <a:prstGeom prst="rect">
+            <a:avLst/>
+          </a:prstGeom>
+        </p:spPr>
+      </p:pic>
     </p:spTree>
     <p:extLst>
       <p:ext uri="{BB962C8B-B14F-4D97-AF65-F5344CB8AC3E}">
@@ -6136,6 +6322,13 @@
   <p:clrMapOvr>
     <a:masterClrMapping/>
   </p:clrMapOvr>
+  <p:timing>
+    <p:tnLst>
+      <p:par>
+        <p:cTn id="1" dur="indefinite" restart="never" nodeType="tmRoot"/>
+      </p:par>
+    </p:tnLst>
+  </p:timing>
 </p:sld>
 </file>
 
@@ -6188,9 +6381,16 @@
             <p:ph idx="1"/>
           </p:nvPr>
         </p:nvSpPr>
-        <p:spPr/>
-        <p:txBody>
-          <a:bodyPr/>
+        <p:spPr>
+          <a:xfrm>
+            <a:off x="822960" y="1100628"/>
+            <a:ext cx="5564075" cy="3480515"/>
+          </a:xfrm>
+        </p:spPr>
+        <p:txBody>
+          <a:bodyPr>
+            <a:normAutofit/>
+          </a:bodyPr>
           <a:lstStyle/>
           <a:p>
             <a:pPr>
@@ -6199,7 +6399,11 @@
             </a:pPr>
             <a:r>
               <a:rPr lang="en-US" dirty="0"/>
-              <a:t>Preconditions/Setup: Tester must have placed an order, and be at the order confirmation page.</a:t>
+              <a:t>Preconditions/Setup: </a:t>
+            </a:r>
+            <a:r>
+              <a:rPr lang="en-US" b="0" dirty="0"/>
+              <a:t>Tester must have placed an order, and be at the order confirmation page.</a:t>
             </a:r>
           </a:p>
           <a:p>
@@ -6209,7 +6413,11 @@
             </a:pPr>
             <a:r>
               <a:rPr lang="en-US" dirty="0"/>
-              <a:t>Requirement(s) Tested: Confirm/Cancel Order</a:t>
+              <a:t>Requirement(s) Tested: </a:t>
+            </a:r>
+            <a:r>
+              <a:rPr lang="en-US" b="0" dirty="0"/>
+              <a:t>Confirm/Cancel Order</a:t>
             </a:r>
           </a:p>
           <a:p>
@@ -6219,7 +6427,11 @@
             </a:pPr>
             <a:r>
               <a:rPr lang="en-US" dirty="0"/>
-              <a:t>Action 1: Tester activates the Confirm Order button.</a:t>
+              <a:t>Action 1: </a:t>
+            </a:r>
+            <a:r>
+              <a:rPr lang="en-US" b="0" dirty="0"/>
+              <a:t>Tester activates the Confirm Order button.</a:t>
             </a:r>
           </a:p>
           <a:p>
@@ -6229,7 +6441,11 @@
             </a:pPr>
             <a:r>
               <a:rPr lang="en-US" dirty="0"/>
-              <a:t>Verify 1: Tester confirms that they are now prompted for payment information.</a:t>
+              <a:t>Verify 1: </a:t>
+            </a:r>
+            <a:r>
+              <a:rPr lang="en-US" b="0" dirty="0"/>
+              <a:t>Tester confirms that they are now prompted for payment information.</a:t>
             </a:r>
           </a:p>
           <a:p>
@@ -6239,7 +6455,11 @@
             </a:pPr>
             <a:r>
               <a:rPr lang="en-US" dirty="0"/>
-              <a:t>Action 2: Tester enters payment information, and activates the Complete Order button.</a:t>
+              <a:t>Action 2: </a:t>
+            </a:r>
+            <a:r>
+              <a:rPr lang="en-US" b="0" dirty="0"/>
+              <a:t>Tester enters payment information, and activates the Complete Order button.</a:t>
             </a:r>
           </a:p>
           <a:p>
@@ -6249,12 +6469,44 @@
             </a:pPr>
             <a:r>
               <a:rPr lang="en-US" dirty="0"/>
-              <a:t>Verify 2: Tester confirms that they receive their receipt via email.</a:t>
-            </a:r>
-            <a:endParaRPr lang="en-US" dirty="0"/>
-          </a:p>
-        </p:txBody>
-      </p:sp>
+              <a:t>Verify 2: </a:t>
+            </a:r>
+            <a:r>
+              <a:rPr lang="en-US" b="0" dirty="0"/>
+              <a:t>Tester confirms that they receive their receipt via email.</a:t>
+            </a:r>
+          </a:p>
+        </p:txBody>
+      </p:sp>
+      <p:pic>
+        <p:nvPicPr>
+          <p:cNvPr id="5" name="Picture 4"/>
+          <p:cNvPicPr>
+            <a:picLocks noChangeAspect="1"/>
+          </p:cNvPicPr>
+          <p:nvPr/>
+        </p:nvPicPr>
+        <p:blipFill rotWithShape="1">
+          <a:blip r:embed="rId2">
+            <a:extLst>
+              <a:ext uri="{28A0092B-C50C-407E-A947-70E740481C1C}">
+                <a14:useLocalDpi xmlns:a14="http://schemas.microsoft.com/office/drawing/2010/main" val="0"/>
+              </a:ext>
+            </a:extLst>
+          </a:blip>
+          <a:srcRect l="81958" t="-398" r="124" b="8460"/>
+          <a:stretch/>
+        </p:blipFill>
+        <p:spPr>
+          <a:xfrm>
+            <a:off x="6821423" y="287464"/>
+            <a:ext cx="1394461" cy="4442069"/>
+          </a:xfrm>
+          <a:prstGeom prst="rect">
+            <a:avLst/>
+          </a:prstGeom>
+        </p:spPr>
+      </p:pic>
     </p:spTree>
     <p:extLst>
       <p:ext uri="{BB962C8B-B14F-4D97-AF65-F5344CB8AC3E}">

</xml_diff>